<commit_message>
Update gitbook 2023-05-16 18:20:46
</commit_message>
<xml_diff>
--- a/Lesson06Conditionals/Booleans.pptx
+++ b/Lesson06Conditionals/Booleans.pptx
@@ -4751,13 +4751,13 @@
   <p:clrMapOvr>
     <a:masterClrMapping/>
   </p:clrMapOvr>
-  <mc:AlternateContent xmlns:mc="http://schemas.openxmlformats.org/markup-compatibility/2006">
-    <mc:Choice xmlns:p159="http://schemas.microsoft.com/office/powerpoint/2015/09/main" Requires="p159">
+  <mc:AlternateContent xmlns:mc="http://schemas.openxmlformats.org/markup-compatibility/2006" xmlns:p159="http://schemas.microsoft.com/office/powerpoint/2015/09/main">
+    <mc:Choice Requires="p159">
       <p:transition xmlns:p14="http://schemas.microsoft.com/office/powerpoint/2010/main" spd="slow" p14:dur="2000">
         <p159:morph option="byObject"/>
       </p:transition>
     </mc:Choice>
-    <mc:Fallback>
+    <mc:Fallback xmlns="">
       <p:transition spd="slow">
         <p:fade/>
       </p:transition>
@@ -5759,13 +5759,13 @@
   <p:clrMapOvr>
     <a:masterClrMapping/>
   </p:clrMapOvr>
-  <mc:AlternateContent xmlns:mc="http://schemas.openxmlformats.org/markup-compatibility/2006">
-    <mc:Choice xmlns:p159="http://schemas.microsoft.com/office/powerpoint/2015/09/main" Requires="p159">
+  <mc:AlternateContent xmlns:mc="http://schemas.openxmlformats.org/markup-compatibility/2006" xmlns:p159="http://schemas.microsoft.com/office/powerpoint/2015/09/main">
+    <mc:Choice Requires="p159">
       <p:transition xmlns:p14="http://schemas.microsoft.com/office/powerpoint/2010/main" spd="slow" p14:dur="2000">
         <p159:morph option="byObject"/>
       </p:transition>
     </mc:Choice>
-    <mc:Fallback>
+    <mc:Fallback xmlns="">
       <p:transition spd="slow">
         <p:fade/>
       </p:transition>
@@ -6538,13 +6538,13 @@
   <p:clrMapOvr>
     <a:masterClrMapping/>
   </p:clrMapOvr>
-  <mc:AlternateContent xmlns:mc="http://schemas.openxmlformats.org/markup-compatibility/2006">
-    <mc:Choice xmlns:p159="http://schemas.microsoft.com/office/powerpoint/2015/09/main" Requires="p159">
+  <mc:AlternateContent xmlns:mc="http://schemas.openxmlformats.org/markup-compatibility/2006" xmlns:p159="http://schemas.microsoft.com/office/powerpoint/2015/09/main">
+    <mc:Choice Requires="p159">
       <p:transition xmlns:p14="http://schemas.microsoft.com/office/powerpoint/2010/main" spd="slow" p14:dur="2000">
         <p159:morph option="byObject"/>
       </p:transition>
     </mc:Choice>
-    <mc:Fallback>
+    <mc:Fallback xmlns="">
       <p:transition spd="slow">
         <p:fade/>
       </p:transition>
@@ -7572,7 +7572,7 @@
             <a:pPr algn="r"/>
             <a:r>
               <a:rPr lang="en-US" dirty="0"/>
-              <a:t>true/false trivia</a:t>
+              <a:t>true/false trivia 2</a:t>
             </a:r>
           </a:p>
         </p:txBody>
@@ -7591,8 +7591,8 @@
         </p:nvSpPr>
         <p:spPr>
           <a:xfrm rot="5400000">
-            <a:off x="2776789" y="-2488299"/>
-            <a:ext cx="542424" cy="6096001"/>
+            <a:off x="2591147" y="-2302656"/>
+            <a:ext cx="542424" cy="5724716"/>
           </a:xfrm>
           <a:prstGeom prst="rect">
             <a:avLst/>
@@ -7685,13 +7685,13 @@
   <p:clrMapOvr>
     <a:masterClrMapping/>
   </p:clrMapOvr>
-  <mc:AlternateContent xmlns:mc="http://schemas.openxmlformats.org/markup-compatibility/2006">
-    <mc:Choice xmlns:p159="http://schemas.microsoft.com/office/powerpoint/2015/09/main" Requires="p159">
+  <mc:AlternateContent xmlns:mc="http://schemas.openxmlformats.org/markup-compatibility/2006" xmlns:p159="http://schemas.microsoft.com/office/powerpoint/2015/09/main">
+    <mc:Choice Requires="p159">
       <p:transition xmlns:p14="http://schemas.microsoft.com/office/powerpoint/2010/main" spd="slow" p14:dur="2000">
         <p159:morph option="byObject"/>
       </p:transition>
     </mc:Choice>
-    <mc:Fallback>
+    <mc:Fallback xmlns="">
       <p:transition spd="slow">
         <p:fade/>
       </p:transition>
@@ -14771,13 +14771,13 @@
   <p:clrMapOvr>
     <a:masterClrMapping/>
   </p:clrMapOvr>
-  <mc:AlternateContent xmlns:mc="http://schemas.openxmlformats.org/markup-compatibility/2006">
-    <mc:Choice xmlns:p159="http://schemas.microsoft.com/office/powerpoint/2015/09/main" Requires="p159">
+  <mc:AlternateContent xmlns:mc="http://schemas.openxmlformats.org/markup-compatibility/2006" xmlns:p159="http://schemas.microsoft.com/office/powerpoint/2015/09/main">
+    <mc:Choice Requires="p159">
       <p:transition xmlns:p14="http://schemas.microsoft.com/office/powerpoint/2010/main" spd="slow" p14:dur="2000">
         <p159:morph option="byObject"/>
       </p:transition>
     </mc:Choice>
-    <mc:Fallback>
+    <mc:Fallback xmlns="">
       <p:transition spd="slow">
         <p:fade/>
       </p:transition>
@@ -15115,13 +15115,13 @@
   <p:clrMapOvr>
     <a:masterClrMapping/>
   </p:clrMapOvr>
-  <mc:AlternateContent xmlns:mc="http://schemas.openxmlformats.org/markup-compatibility/2006">
-    <mc:Choice xmlns:p159="http://schemas.microsoft.com/office/powerpoint/2015/09/main" Requires="p159">
+  <mc:AlternateContent xmlns:mc="http://schemas.openxmlformats.org/markup-compatibility/2006" xmlns:p159="http://schemas.microsoft.com/office/powerpoint/2015/09/main">
+    <mc:Choice Requires="p159">
       <p:transition xmlns:p14="http://schemas.microsoft.com/office/powerpoint/2010/main" spd="slow" p14:dur="2000">
         <p159:morph option="byObject"/>
       </p:transition>
     </mc:Choice>
-    <mc:Fallback>
+    <mc:Fallback xmlns="">
       <p:transition spd="slow">
         <p:fade/>
       </p:transition>

</xml_diff>